<commit_message>
change font in figures chapter 1
</commit_message>
<xml_diff>
--- a/Figures/Chapter_01/drawings/Fig1.3_Cell_module_system.pptx
+++ b/Figures/Chapter_01/drawings/Fig1.3_Cell_module_system.pptx
@@ -261,7 +261,7 @@
           <a:p>
             <a:fld id="{8B1A925D-6802-4F82-B3A4-43BDB522D203}" type="datetimeFigureOut">
               <a:rPr lang="en-GB" smtClean="0"/>
-              <a:t>09/11/2021</a:t>
+              <a:t>19/01/2022</a:t>
             </a:fld>
             <a:endParaRPr lang="en-GB"/>
           </a:p>
@@ -461,7 +461,7 @@
           <a:p>
             <a:fld id="{8B1A925D-6802-4F82-B3A4-43BDB522D203}" type="datetimeFigureOut">
               <a:rPr lang="en-GB" smtClean="0"/>
-              <a:t>09/11/2021</a:t>
+              <a:t>19/01/2022</a:t>
             </a:fld>
             <a:endParaRPr lang="en-GB"/>
           </a:p>
@@ -671,7 +671,7 @@
           <a:p>
             <a:fld id="{8B1A925D-6802-4F82-B3A4-43BDB522D203}" type="datetimeFigureOut">
               <a:rPr lang="en-GB" smtClean="0"/>
-              <a:t>09/11/2021</a:t>
+              <a:t>19/01/2022</a:t>
             </a:fld>
             <a:endParaRPr lang="en-GB"/>
           </a:p>
@@ -871,7 +871,7 @@
           <a:p>
             <a:fld id="{8B1A925D-6802-4F82-B3A4-43BDB522D203}" type="datetimeFigureOut">
               <a:rPr lang="en-GB" smtClean="0"/>
-              <a:t>09/11/2021</a:t>
+              <a:t>19/01/2022</a:t>
             </a:fld>
             <a:endParaRPr lang="en-GB"/>
           </a:p>
@@ -1147,7 +1147,7 @@
           <a:p>
             <a:fld id="{8B1A925D-6802-4F82-B3A4-43BDB522D203}" type="datetimeFigureOut">
               <a:rPr lang="en-GB" smtClean="0"/>
-              <a:t>09/11/2021</a:t>
+              <a:t>19/01/2022</a:t>
             </a:fld>
             <a:endParaRPr lang="en-GB"/>
           </a:p>
@@ -1415,7 +1415,7 @@
           <a:p>
             <a:fld id="{8B1A925D-6802-4F82-B3A4-43BDB522D203}" type="datetimeFigureOut">
               <a:rPr lang="en-GB" smtClean="0"/>
-              <a:t>09/11/2021</a:t>
+              <a:t>19/01/2022</a:t>
             </a:fld>
             <a:endParaRPr lang="en-GB"/>
           </a:p>
@@ -1830,7 +1830,7 @@
           <a:p>
             <a:fld id="{8B1A925D-6802-4F82-B3A4-43BDB522D203}" type="datetimeFigureOut">
               <a:rPr lang="en-GB" smtClean="0"/>
-              <a:t>09/11/2021</a:t>
+              <a:t>19/01/2022</a:t>
             </a:fld>
             <a:endParaRPr lang="en-GB"/>
           </a:p>
@@ -1972,7 +1972,7 @@
           <a:p>
             <a:fld id="{8B1A925D-6802-4F82-B3A4-43BDB522D203}" type="datetimeFigureOut">
               <a:rPr lang="en-GB" smtClean="0"/>
-              <a:t>09/11/2021</a:t>
+              <a:t>19/01/2022</a:t>
             </a:fld>
             <a:endParaRPr lang="en-GB"/>
           </a:p>
@@ -2085,7 +2085,7 @@
           <a:p>
             <a:fld id="{8B1A925D-6802-4F82-B3A4-43BDB522D203}" type="datetimeFigureOut">
               <a:rPr lang="en-GB" smtClean="0"/>
-              <a:t>09/11/2021</a:t>
+              <a:t>19/01/2022</a:t>
             </a:fld>
             <a:endParaRPr lang="en-GB"/>
           </a:p>
@@ -2398,7 +2398,7 @@
           <a:p>
             <a:fld id="{8B1A925D-6802-4F82-B3A4-43BDB522D203}" type="datetimeFigureOut">
               <a:rPr lang="en-GB" smtClean="0"/>
-              <a:t>09/11/2021</a:t>
+              <a:t>19/01/2022</a:t>
             </a:fld>
             <a:endParaRPr lang="en-GB"/>
           </a:p>
@@ -2687,7 +2687,7 @@
           <a:p>
             <a:fld id="{8B1A925D-6802-4F82-B3A4-43BDB522D203}" type="datetimeFigureOut">
               <a:rPr lang="en-GB" smtClean="0"/>
-              <a:t>09/11/2021</a:t>
+              <a:t>19/01/2022</a:t>
             </a:fld>
             <a:endParaRPr lang="en-GB"/>
           </a:p>
@@ -2930,7 +2930,7 @@
           <a:p>
             <a:fld id="{8B1A925D-6802-4F82-B3A4-43BDB522D203}" type="datetimeFigureOut">
               <a:rPr lang="en-GB" smtClean="0"/>
-              <a:t>09/11/2021</a:t>
+              <a:t>19/01/2022</a:t>
             </a:fld>
             <a:endParaRPr lang="en-GB"/>
           </a:p>
@@ -3421,33 +3421,35 @@
           <a:lstStyle/>
           <a:p>
             <a:r>
-              <a:rPr lang="en-GB" dirty="0">
-                <a:latin typeface="Corbel" panose="020B0503020204020204" pitchFamily="34" charset="0"/>
-              </a:rPr>
-              <a:t>Solar cell </a:t>
-            </a:r>
-            <a:r>
-              <a:rPr lang="en-GB">
-                <a:latin typeface="Corbel" panose="020B0503020204020204" pitchFamily="34" charset="0"/>
-              </a:rPr>
-              <a:t>(6.2W</a:t>
+              <a:rPr lang="en-GB" dirty="0"/>
+              <a:t>Solar cell (</a:t>
             </a:r>
             <a:r>
               <a:rPr lang="en-GB" dirty="0">
-                <a:latin typeface="Corbel" panose="020B0503020204020204" pitchFamily="34" charset="0"/>
+                <a:cs typeface="Calibri" panose="020F0502020204030204" pitchFamily="34" charset="0"/>
               </a:rPr>
-              <a:t>, 275 cm</a:t>
+              <a:t>6.2</a:t>
             </a:r>
             <a:r>
-              <a:rPr lang="en-GB" baseline="30000" dirty="0">
-                <a:latin typeface="Corbel" panose="020B0503020204020204" pitchFamily="34" charset="0"/>
+              <a:rPr lang="en-GB" dirty="0"/>
+              <a:t>W, </a:t>
+            </a:r>
+            <a:r>
+              <a:rPr lang="en-GB" dirty="0">
+                <a:cs typeface="Calibri" panose="020F0502020204030204" pitchFamily="34" charset="0"/>
               </a:rPr>
+              <a:t>275</a:t>
+            </a:r>
+            <a:r>
+              <a:rPr lang="en-GB" dirty="0"/>
+              <a:t> cm</a:t>
+            </a:r>
+            <a:r>
+              <a:rPr lang="en-GB" baseline="30000" dirty="0"/>
               <a:t>2 </a:t>
             </a:r>
             <a:r>
-              <a:rPr lang="en-GB" dirty="0">
-                <a:latin typeface="Corbel" panose="020B0503020204020204" pitchFamily="34" charset="0"/>
-              </a:rPr>
+              <a:rPr lang="en-GB" dirty="0"/>
               <a:t>)</a:t>
             </a:r>
           </a:p>
@@ -3482,21 +3484,15 @@
           <a:lstStyle/>
           <a:p>
             <a:r>
-              <a:rPr lang="en-GB" dirty="0">
-                <a:latin typeface="Corbel" panose="020B0503020204020204" pitchFamily="34" charset="0"/>
-              </a:rPr>
-              <a:t>PV module ( 500W, area 2.5 m</a:t>
+              <a:rPr lang="en-GB" dirty="0"/>
+              <a:t>PV module (500W, area 2.5 m</a:t>
             </a:r>
             <a:r>
-              <a:rPr lang="en-GB" baseline="30000" dirty="0">
-                <a:latin typeface="Corbel" panose="020B0503020204020204" pitchFamily="34" charset="0"/>
-              </a:rPr>
+              <a:rPr lang="en-GB" baseline="30000" dirty="0"/>
               <a:t>2</a:t>
             </a:r>
             <a:r>
-              <a:rPr lang="en-GB" dirty="0">
-                <a:latin typeface="Corbel" panose="020B0503020204020204" pitchFamily="34" charset="0"/>
-              </a:rPr>
+              <a:rPr lang="en-GB" dirty="0"/>
               <a:t>)</a:t>
             </a:r>
           </a:p>

</xml_diff>

<commit_message>
add figure landuse PV plants
</commit_message>
<xml_diff>
--- a/Figures/Chapter_01/drawings/Fig1.3_Cell_module_system.pptx
+++ b/Figures/Chapter_01/drawings/Fig1.3_Cell_module_system.pptx
@@ -261,7 +261,7 @@
           <a:p>
             <a:fld id="{8B1A925D-6802-4F82-B3A4-43BDB522D203}" type="datetimeFigureOut">
               <a:rPr lang="en-GB" smtClean="0"/>
-              <a:t>13/07/2022</a:t>
+              <a:t>24/08/2022</a:t>
             </a:fld>
             <a:endParaRPr lang="en-GB"/>
           </a:p>
@@ -461,7 +461,7 @@
           <a:p>
             <a:fld id="{8B1A925D-6802-4F82-B3A4-43BDB522D203}" type="datetimeFigureOut">
               <a:rPr lang="en-GB" smtClean="0"/>
-              <a:t>13/07/2022</a:t>
+              <a:t>24/08/2022</a:t>
             </a:fld>
             <a:endParaRPr lang="en-GB"/>
           </a:p>
@@ -671,7 +671,7 @@
           <a:p>
             <a:fld id="{8B1A925D-6802-4F82-B3A4-43BDB522D203}" type="datetimeFigureOut">
               <a:rPr lang="en-GB" smtClean="0"/>
-              <a:t>13/07/2022</a:t>
+              <a:t>24/08/2022</a:t>
             </a:fld>
             <a:endParaRPr lang="en-GB"/>
           </a:p>
@@ -871,7 +871,7 @@
           <a:p>
             <a:fld id="{8B1A925D-6802-4F82-B3A4-43BDB522D203}" type="datetimeFigureOut">
               <a:rPr lang="en-GB" smtClean="0"/>
-              <a:t>13/07/2022</a:t>
+              <a:t>24/08/2022</a:t>
             </a:fld>
             <a:endParaRPr lang="en-GB"/>
           </a:p>
@@ -1147,7 +1147,7 @@
           <a:p>
             <a:fld id="{8B1A925D-6802-4F82-B3A4-43BDB522D203}" type="datetimeFigureOut">
               <a:rPr lang="en-GB" smtClean="0"/>
-              <a:t>13/07/2022</a:t>
+              <a:t>24/08/2022</a:t>
             </a:fld>
             <a:endParaRPr lang="en-GB"/>
           </a:p>
@@ -1415,7 +1415,7 @@
           <a:p>
             <a:fld id="{8B1A925D-6802-4F82-B3A4-43BDB522D203}" type="datetimeFigureOut">
               <a:rPr lang="en-GB" smtClean="0"/>
-              <a:t>13/07/2022</a:t>
+              <a:t>24/08/2022</a:t>
             </a:fld>
             <a:endParaRPr lang="en-GB"/>
           </a:p>
@@ -1830,7 +1830,7 @@
           <a:p>
             <a:fld id="{8B1A925D-6802-4F82-B3A4-43BDB522D203}" type="datetimeFigureOut">
               <a:rPr lang="en-GB" smtClean="0"/>
-              <a:t>13/07/2022</a:t>
+              <a:t>24/08/2022</a:t>
             </a:fld>
             <a:endParaRPr lang="en-GB"/>
           </a:p>
@@ -1972,7 +1972,7 @@
           <a:p>
             <a:fld id="{8B1A925D-6802-4F82-B3A4-43BDB522D203}" type="datetimeFigureOut">
               <a:rPr lang="en-GB" smtClean="0"/>
-              <a:t>13/07/2022</a:t>
+              <a:t>24/08/2022</a:t>
             </a:fld>
             <a:endParaRPr lang="en-GB"/>
           </a:p>
@@ -2085,7 +2085,7 @@
           <a:p>
             <a:fld id="{8B1A925D-6802-4F82-B3A4-43BDB522D203}" type="datetimeFigureOut">
               <a:rPr lang="en-GB" smtClean="0"/>
-              <a:t>13/07/2022</a:t>
+              <a:t>24/08/2022</a:t>
             </a:fld>
             <a:endParaRPr lang="en-GB"/>
           </a:p>
@@ -2398,7 +2398,7 @@
           <a:p>
             <a:fld id="{8B1A925D-6802-4F82-B3A4-43BDB522D203}" type="datetimeFigureOut">
               <a:rPr lang="en-GB" smtClean="0"/>
-              <a:t>13/07/2022</a:t>
+              <a:t>24/08/2022</a:t>
             </a:fld>
             <a:endParaRPr lang="en-GB"/>
           </a:p>
@@ -2687,7 +2687,7 @@
           <a:p>
             <a:fld id="{8B1A925D-6802-4F82-B3A4-43BDB522D203}" type="datetimeFigureOut">
               <a:rPr lang="en-GB" smtClean="0"/>
-              <a:t>13/07/2022</a:t>
+              <a:t>24/08/2022</a:t>
             </a:fld>
             <a:endParaRPr lang="en-GB"/>
           </a:p>
@@ -2930,7 +2930,7 @@
           <a:p>
             <a:fld id="{8B1A925D-6802-4F82-B3A4-43BDB522D203}" type="datetimeFigureOut">
               <a:rPr lang="en-GB" smtClean="0"/>
-              <a:t>13/07/2022</a:t>
+              <a:t>24/08/2022</a:t>
             </a:fld>
             <a:endParaRPr lang="en-GB"/>
           </a:p>
@@ -3423,7 +3423,21 @@
                 <a:latin typeface="Arial" panose="020B0604020202020204" pitchFamily="34" charset="0"/>
                 <a:cs typeface="Arial" panose="020B0604020202020204" pitchFamily="34" charset="0"/>
               </a:rPr>
-              <a:t>Solar cell (6.2W, 275 cm</a:t>
+              <a:t>Solar cell </a:t>
+            </a:r>
+            <a:r>
+              <a:rPr lang="en-GB" sz="1600">
+                <a:latin typeface="Arial" panose="020B0604020202020204" pitchFamily="34" charset="0"/>
+                <a:cs typeface="Arial" panose="020B0604020202020204" pitchFamily="34" charset="0"/>
+              </a:rPr>
+              <a:t>(6W</a:t>
+            </a:r>
+            <a:r>
+              <a:rPr lang="en-GB" sz="1600" dirty="0">
+                <a:latin typeface="Arial" panose="020B0604020202020204" pitchFamily="34" charset="0"/>
+                <a:cs typeface="Arial" panose="020B0604020202020204" pitchFamily="34" charset="0"/>
+              </a:rPr>
+              <a:t>, 275 cm</a:t>
             </a:r>
             <a:r>
               <a:rPr lang="en-GB" sz="1600" baseline="30000" dirty="0">

</xml_diff>